<commit_message>
completato il power point
</commit_message>
<xml_diff>
--- a/Report dei risultati.pptx
+++ b/Report dei risultati.pptx
@@ -14361,28 +14361,30 @@
           </a:bodyPr>
           <a:lstStyle/>
           <a:p>
-            <a:pPr marL="0" lvl="0" indent="0" algn="l" rtl="0">
-              <a:spcBef>
-                <a:spcPts val="0"/>
-              </a:spcBef>
-              <a:spcAft>
-                <a:spcPts val="0"/>
-              </a:spcAft>
-              <a:buNone/>
+            <a:pPr marL="171450" lvl="0" indent="-171450" algn="l" rtl="0">
+              <a:spcBef>
+                <a:spcPts val="0"/>
+              </a:spcBef>
+              <a:spcAft>
+                <a:spcPts val="0"/>
+              </a:spcAft>
+              <a:buFont typeface="Arial" panose="020B0604020202020204" pitchFamily="34" charset="0"/>
+              <a:buChar char="•"/>
             </a:pPr>
             <a:r>
-              <a:rPr lang="it" sz="900">
-                <a:solidFill>
-                  <a:srgbClr val="5A6772"/>
-                </a:solidFill>
-                <a:latin typeface="Titillium Web"/>
-                <a:ea typeface="Titillium Web"/>
-                <a:cs typeface="Titillium Web"/>
-                <a:sym typeface="Titillium Web"/>
+              <a:rPr lang="it-IT" sz="800" u="sng" dirty="0">
+                <a:solidFill>
+                  <a:srgbClr val="0000FF"/>
+                </a:solidFill>
+                <a:effectLst/>
+                <a:latin typeface="Arial" panose="020B0604020202020204" pitchFamily="34" charset="0"/>
+                <a:ea typeface="Calibri" panose="020F0502020204030204" pitchFamily="34" charset="0"/>
+                <a:cs typeface="Cambria" panose="02040503050406030204" pitchFamily="18" charset="0"/>
+                <a:hlinkClick r:id="rId3"/>
               </a:rPr>
-              <a:t>Descrivi qui il criterio di successo….</a:t>
+              <a:t>https://www.ing-inl.unifi.it/</a:t>
             </a:r>
-            <a:endParaRPr sz="900">
+            <a:endParaRPr sz="800" dirty="0">
               <a:solidFill>
                 <a:srgbClr val="5A6772"/>
               </a:solidFill>
@@ -14432,7 +14434,7 @@
               <a:buNone/>
             </a:pPr>
             <a:r>
-              <a:rPr lang="it" sz="1000" b="1">
+              <a:rPr lang="it" sz="1000" b="1" dirty="0">
                 <a:solidFill>
                   <a:srgbClr val="00B8CD"/>
                 </a:solidFill>
@@ -14443,7 +14445,7 @@
               </a:rPr>
               <a:t>CRITERIO DI SUCCESSO 1*</a:t>
             </a:r>
-            <a:endParaRPr sz="1000" b="1">
+            <a:endParaRPr sz="1000" b="1" dirty="0">
               <a:solidFill>
                 <a:srgbClr val="00B8CD"/>
               </a:solidFill>
@@ -14466,7 +14468,7 @@
               </a:spcAft>
               <a:buNone/>
             </a:pPr>
-            <a:endParaRPr sz="1000">
+            <a:endParaRPr sz="1000" dirty="0">
               <a:solidFill>
                 <a:srgbClr val="5A6772"/>
               </a:solidFill>
@@ -14516,7 +14518,7 @@
               <a:buNone/>
             </a:pPr>
             <a:r>
-              <a:rPr lang="it" sz="2400" b="1">
+              <a:rPr lang="it" sz="2400" b="1" dirty="0">
                 <a:solidFill>
                   <a:srgbClr val="0056CB"/>
                 </a:solidFill>
@@ -14527,7 +14529,7 @@
               </a:rPr>
               <a:t>TASK 1</a:t>
             </a:r>
-            <a:endParaRPr sz="2400" b="1">
+            <a:endParaRPr sz="2400" b="1" dirty="0">
               <a:solidFill>
                 <a:srgbClr val="0056CB"/>
               </a:solidFill>
@@ -14550,7 +14552,7 @@
               </a:spcAft>
               <a:buNone/>
             </a:pPr>
-            <a:endParaRPr sz="2400">
+            <a:endParaRPr sz="2400" dirty="0">
               <a:solidFill>
                 <a:srgbClr val="0056CB"/>
               </a:solidFill>
@@ -14597,7 +14599,7 @@
               <a:buNone/>
             </a:pPr>
             <a:r>
-              <a:rPr lang="it" sz="900">
+              <a:rPr lang="it-IT" sz="800" dirty="0">
                 <a:solidFill>
                   <a:srgbClr val="5A6772"/>
                 </a:solidFill>
@@ -14606,17 +14608,8 @@
                 <a:cs typeface="Titillium Web"/>
                 <a:sym typeface="Titillium Web"/>
               </a:rPr>
-              <a:t>Descrivi qui il criterio di successo….</a:t>
+              <a:t>Possibile sequenza di operazioni per arrivare alla soluzione dalla</a:t>
             </a:r>
-            <a:endParaRPr sz="900">
-              <a:solidFill>
-                <a:srgbClr val="5A6772"/>
-              </a:solidFill>
-              <a:latin typeface="Titillium Web SemiBold"/>
-              <a:ea typeface="Titillium Web SemiBold"/>
-              <a:cs typeface="Titillium Web SemiBold"/>
-              <a:sym typeface="Titillium Web SemiBold"/>
-            </a:endParaRPr>
           </a:p>
           <a:p>
             <a:pPr marL="0" lvl="0" indent="0" algn="l" rtl="0">
@@ -14628,7 +14621,126 @@
               </a:spcAft>
               <a:buNone/>
             </a:pPr>
-            <a:endParaRPr sz="900">
+            <a:r>
+              <a:rPr lang="it-IT" sz="800" dirty="0">
+                <a:solidFill>
+                  <a:srgbClr val="5A6772"/>
+                </a:solidFill>
+                <a:latin typeface="Titillium Web"/>
+                <a:ea typeface="Titillium Web"/>
+                <a:cs typeface="Titillium Web"/>
+                <a:sym typeface="Titillium Web"/>
+              </a:rPr>
+              <a:t>Homepage:</a:t>
+            </a:r>
+          </a:p>
+          <a:p>
+            <a:pPr marL="171450" lvl="0" indent="-171450" algn="l" rtl="0">
+              <a:spcBef>
+                <a:spcPts val="0"/>
+              </a:spcBef>
+              <a:spcAft>
+                <a:spcPts val="0"/>
+              </a:spcAft>
+              <a:buFont typeface="Arial" panose="020B0604020202020204" pitchFamily="34" charset="0"/>
+              <a:buChar char="•"/>
+            </a:pPr>
+            <a:r>
+              <a:rPr lang="it-IT" sz="800" dirty="0">
+                <a:solidFill>
+                  <a:srgbClr val="5A6772"/>
+                </a:solidFill>
+                <a:latin typeface="Titillium Web"/>
+                <a:ea typeface="Titillium Web"/>
+                <a:cs typeface="Titillium Web"/>
+                <a:sym typeface="Titillium Web"/>
+              </a:rPr>
+              <a:t>Cliccare la voce «didattica»</a:t>
+            </a:r>
+          </a:p>
+          <a:p>
+            <a:pPr marL="171450" lvl="0" indent="-171450" algn="l" rtl="0">
+              <a:spcBef>
+                <a:spcPts val="0"/>
+              </a:spcBef>
+              <a:spcAft>
+                <a:spcPts val="0"/>
+              </a:spcAft>
+              <a:buFont typeface="Arial" panose="020B0604020202020204" pitchFamily="34" charset="0"/>
+              <a:buChar char="•"/>
+            </a:pPr>
+            <a:r>
+              <a:rPr lang="it-IT" sz="800" dirty="0">
+                <a:solidFill>
+                  <a:srgbClr val="5A6772"/>
+                </a:solidFill>
+                <a:latin typeface="Titillium Web"/>
+                <a:ea typeface="Titillium Web"/>
+                <a:cs typeface="Titillium Web"/>
+                <a:sym typeface="Titillium Web"/>
+              </a:rPr>
+              <a:t>Selezionare la sottovoce «Corsi di Laurea»</a:t>
+            </a:r>
+          </a:p>
+          <a:p>
+            <a:pPr marL="171450" lvl="0" indent="-171450" algn="l" rtl="0">
+              <a:spcBef>
+                <a:spcPts val="0"/>
+              </a:spcBef>
+              <a:spcAft>
+                <a:spcPts val="0"/>
+              </a:spcAft>
+              <a:buFont typeface="Arial" panose="020B0604020202020204" pitchFamily="34" charset="0"/>
+              <a:buChar char="•"/>
+            </a:pPr>
+            <a:r>
+              <a:rPr lang="it-IT" sz="800" dirty="0">
+                <a:solidFill>
+                  <a:srgbClr val="5A6772"/>
+                </a:solidFill>
+                <a:latin typeface="Titillium Web"/>
+                <a:ea typeface="Titillium Web"/>
+                <a:cs typeface="Titillium Web"/>
+                <a:sym typeface="Titillium Web"/>
+              </a:rPr>
+              <a:t>Selezionare «Corsi di laurea Triennali e magistrali a ciclo unico»</a:t>
+            </a:r>
+          </a:p>
+          <a:p>
+            <a:pPr marL="171450" lvl="0" indent="-171450" algn="l" rtl="0">
+              <a:spcBef>
+                <a:spcPts val="0"/>
+              </a:spcBef>
+              <a:spcAft>
+                <a:spcPts val="0"/>
+              </a:spcAft>
+              <a:buFont typeface="Arial" panose="020B0604020202020204" pitchFamily="34" charset="0"/>
+              <a:buChar char="•"/>
+            </a:pPr>
+            <a:r>
+              <a:rPr lang="it-IT" sz="800" dirty="0">
+                <a:solidFill>
+                  <a:srgbClr val="5A6772"/>
+                </a:solidFill>
+                <a:latin typeface="Titillium Web"/>
+                <a:ea typeface="Titillium Web"/>
+                <a:cs typeface="Titillium Web"/>
+                <a:sym typeface="Titillium Web"/>
+              </a:rPr>
+              <a:t>Selezionare la voce «informatica» in «Scienze Matematiche, Fisiche e Naturali2</a:t>
+            </a:r>
+          </a:p>
+          <a:p>
+            <a:pPr marL="0" lvl="0" indent="0" algn="l" rtl="0">
+              <a:spcBef>
+                <a:spcPts val="0"/>
+              </a:spcBef>
+              <a:spcAft>
+                <a:spcPts val="0"/>
+              </a:spcAft>
+              <a:buNone/>
+            </a:pPr>
+            <a:endParaRPr lang="it-IT" sz="800" dirty="0">
               <a:solidFill>
                 <a:srgbClr val="5A6772"/>
               </a:solidFill>
@@ -14678,7 +14790,7 @@
               <a:buNone/>
             </a:pPr>
             <a:r>
-              <a:rPr lang="it" sz="1000" b="1">
+              <a:rPr lang="it" sz="1000" b="1" dirty="0">
                 <a:solidFill>
                   <a:srgbClr val="00B8CD"/>
                 </a:solidFill>
@@ -14689,7 +14801,7 @@
               </a:rPr>
               <a:t>CRITERIO DI SUCCESSO 2**</a:t>
             </a:r>
-            <a:endParaRPr sz="1000" b="1">
+            <a:endParaRPr sz="1000" b="1" dirty="0">
               <a:solidFill>
                 <a:srgbClr val="00B8CD"/>
               </a:solidFill>
@@ -14712,7 +14824,7 @@
               </a:spcAft>
               <a:buNone/>
             </a:pPr>
-            <a:endParaRPr sz="1000">
+            <a:endParaRPr sz="1000" dirty="0">
               <a:solidFill>
                 <a:srgbClr val="5A6772"/>
               </a:solidFill>
@@ -14775,28 +14887,82 @@
           </a:bodyPr>
           <a:lstStyle/>
           <a:p>
-            <a:pPr marL="0" lvl="0" indent="0" algn="l" rtl="0">
-              <a:spcBef>
-                <a:spcPts val="0"/>
-              </a:spcBef>
-              <a:spcAft>
-                <a:spcPts val="0"/>
-              </a:spcAft>
-              <a:buNone/>
+            <a:pPr marL="171450" indent="-171450">
+              <a:buFont typeface="Arial" panose="020B0604020202020204" pitchFamily="34" charset="0"/>
+              <a:buChar char="•"/>
             </a:pPr>
             <a:r>
-              <a:rPr lang="it" sz="900">
-                <a:solidFill>
-                  <a:srgbClr val="5A6772"/>
-                </a:solidFill>
-                <a:latin typeface="Titillium Web"/>
-                <a:ea typeface="Titillium Web"/>
-                <a:cs typeface="Titillium Web"/>
-                <a:sym typeface="Titillium Web"/>
+              <a:rPr lang="it-IT" sz="800" u="sng" dirty="0">
+                <a:solidFill>
+                  <a:srgbClr val="0000FF"/>
+                </a:solidFill>
+                <a:effectLst/>
+                <a:latin typeface="Arial" panose="020B0604020202020204" pitchFamily="34" charset="0"/>
+                <a:ea typeface="Calibri" panose="020F0502020204030204" pitchFamily="34" charset="0"/>
+                <a:cs typeface="Cambria" panose="02040503050406030204" pitchFamily="18" charset="0"/>
+                <a:hlinkClick r:id="rId4"/>
               </a:rPr>
-              <a:t>Descrivi qui il criterio di successo….</a:t>
+              <a:t>https://www.unifi.it/p7470.html</a:t>
             </a:r>
-            <a:endParaRPr sz="900">
+            <a:endParaRPr lang="it-IT" sz="800" u="sng" dirty="0">
+              <a:solidFill>
+                <a:srgbClr val="0000FF"/>
+              </a:solidFill>
+              <a:effectLst/>
+              <a:latin typeface="Arial" panose="020B0604020202020204" pitchFamily="34" charset="0"/>
+              <a:ea typeface="Calibri" panose="020F0502020204030204" pitchFamily="34" charset="0"/>
+              <a:cs typeface="Cambria" panose="02040503050406030204" pitchFamily="18" charset="0"/>
+            </a:endParaRPr>
+          </a:p>
+          <a:p>
+            <a:pPr marL="171450" indent="-171450">
+              <a:buFont typeface="Arial" panose="020B0604020202020204" pitchFamily="34" charset="0"/>
+              <a:buChar char="•"/>
+            </a:pPr>
+            <a:r>
+              <a:rPr lang="it-IT" sz="800" u="sng" dirty="0">
+                <a:solidFill>
+                  <a:srgbClr val="0000FF"/>
+                </a:solidFill>
+                <a:effectLst/>
+                <a:latin typeface="Arial" panose="020B0604020202020204" pitchFamily="34" charset="0"/>
+                <a:ea typeface="Calibri" panose="020F0502020204030204" pitchFamily="34" charset="0"/>
+                <a:cs typeface="Cambria" panose="02040503050406030204" pitchFamily="18" charset="0"/>
+                <a:hlinkClick r:id="rId5"/>
+              </a:rPr>
+              <a:t>https://www.unifi.it/p11627.html</a:t>
+            </a:r>
+            <a:endParaRPr lang="it-IT" sz="800" dirty="0">
+              <a:effectLst/>
+              <a:latin typeface="Arial" panose="020B0604020202020204" pitchFamily="34" charset="0"/>
+              <a:ea typeface="Arial" panose="020B0604020202020204" pitchFamily="34" charset="0"/>
+            </a:endParaRPr>
+          </a:p>
+          <a:p>
+            <a:pPr marL="171450" lvl="0" indent="-171450" algn="l" rtl="0">
+              <a:spcBef>
+                <a:spcPts val="0"/>
+              </a:spcBef>
+              <a:spcAft>
+                <a:spcPts val="0"/>
+              </a:spcAft>
+              <a:buFont typeface="Arial" panose="020B0604020202020204" pitchFamily="34" charset="0"/>
+              <a:buChar char="•"/>
+            </a:pPr>
+            <a:r>
+              <a:rPr lang="it-IT" sz="800" u="sng" dirty="0">
+                <a:solidFill>
+                  <a:srgbClr val="0000FF"/>
+                </a:solidFill>
+                <a:effectLst/>
+                <a:latin typeface="Arial" panose="020B0604020202020204" pitchFamily="34" charset="0"/>
+                <a:ea typeface="Calibri" panose="020F0502020204030204" pitchFamily="34" charset="0"/>
+                <a:cs typeface="Cambria" panose="02040503050406030204" pitchFamily="18" charset="0"/>
+                <a:hlinkClick r:id="rId6"/>
+              </a:rPr>
+              <a:t>https://www.unifi.it/vp-11161-orientamento-al-lavoro-placement.html</a:t>
+            </a:r>
+            <a:endParaRPr sz="800" dirty="0">
               <a:solidFill>
                 <a:srgbClr val="5A6772"/>
               </a:solidFill>
@@ -14816,7 +14982,7 @@
               </a:spcAft>
               <a:buNone/>
             </a:pPr>
-            <a:endParaRPr sz="900">
+            <a:endParaRPr sz="900" dirty="0">
               <a:solidFill>
                 <a:srgbClr val="5A6772"/>
               </a:solidFill>
@@ -14866,7 +15032,7 @@
               <a:buNone/>
             </a:pPr>
             <a:r>
-              <a:rPr lang="it" sz="1000" b="1">
+              <a:rPr lang="it" sz="1000" b="1" dirty="0">
                 <a:solidFill>
                   <a:srgbClr val="00B8CD"/>
                 </a:solidFill>
@@ -14877,7 +15043,7 @@
               </a:rPr>
               <a:t>CRITERIO DI SUCCESSO 1*</a:t>
             </a:r>
-            <a:endParaRPr sz="1000" b="1">
+            <a:endParaRPr sz="1000" b="1" dirty="0">
               <a:solidFill>
                 <a:srgbClr val="00B8CD"/>
               </a:solidFill>
@@ -14900,7 +15066,7 @@
               </a:spcAft>
               <a:buNone/>
             </a:pPr>
-            <a:endParaRPr sz="1000" b="1">
+            <a:endParaRPr sz="1000" b="1" dirty="0">
               <a:solidFill>
                 <a:srgbClr val="00B8CD"/>
               </a:solidFill>
@@ -14923,7 +15089,7 @@
               </a:spcAft>
               <a:buNone/>
             </a:pPr>
-            <a:endParaRPr sz="1000">
+            <a:endParaRPr sz="1000" dirty="0">
               <a:solidFill>
                 <a:srgbClr val="5A6772"/>
               </a:solidFill>
@@ -15054,7 +15220,7 @@
               <a:buNone/>
             </a:pPr>
             <a:r>
-              <a:rPr lang="it" sz="900">
+              <a:rPr lang="it-IT" sz="800" dirty="0">
                 <a:solidFill>
                   <a:srgbClr val="5A6772"/>
                 </a:solidFill>
@@ -15063,9 +15229,115 @@
                 <a:cs typeface="Titillium Web"/>
                 <a:sym typeface="Titillium Web"/>
               </a:rPr>
-              <a:t>Descrivi qui il criterio di successo….</a:t>
+              <a:t>Possibile sequenza di operazioni per arrivare alla soluzione dalla</a:t>
             </a:r>
-            <a:endParaRPr sz="900">
+          </a:p>
+          <a:p>
+            <a:pPr marL="0" lvl="0" indent="0" algn="l" rtl="0">
+              <a:spcBef>
+                <a:spcPts val="0"/>
+              </a:spcBef>
+              <a:spcAft>
+                <a:spcPts val="0"/>
+              </a:spcAft>
+              <a:buNone/>
+            </a:pPr>
+            <a:r>
+              <a:rPr lang="it-IT" sz="800" dirty="0">
+                <a:solidFill>
+                  <a:srgbClr val="5A6772"/>
+                </a:solidFill>
+                <a:latin typeface="Titillium Web"/>
+                <a:ea typeface="Titillium Web"/>
+                <a:cs typeface="Titillium Web"/>
+                <a:sym typeface="Titillium Web"/>
+              </a:rPr>
+              <a:t>Homepage:</a:t>
+            </a:r>
+          </a:p>
+          <a:p>
+            <a:pPr marL="171450" lvl="0" indent="-171450" algn="l" rtl="0">
+              <a:spcBef>
+                <a:spcPts val="0"/>
+              </a:spcBef>
+              <a:spcAft>
+                <a:spcPts val="0"/>
+              </a:spcAft>
+              <a:buFont typeface="Arial" panose="020B0604020202020204" pitchFamily="34" charset="0"/>
+              <a:buChar char="•"/>
+            </a:pPr>
+            <a:r>
+              <a:rPr lang="it-IT" sz="800" dirty="0">
+                <a:solidFill>
+                  <a:srgbClr val="5A6772"/>
+                </a:solidFill>
+                <a:latin typeface="Titillium Web"/>
+                <a:ea typeface="Titillium Web"/>
+                <a:cs typeface="Titillium Web"/>
+                <a:sym typeface="Titillium Web"/>
+              </a:rPr>
+              <a:t>Cliccare la voce del menu «Terza Missione»</a:t>
+            </a:r>
+          </a:p>
+          <a:p>
+            <a:pPr marL="171450" lvl="0" indent="-171450" algn="l" rtl="0">
+              <a:spcBef>
+                <a:spcPts val="0"/>
+              </a:spcBef>
+              <a:spcAft>
+                <a:spcPts val="0"/>
+              </a:spcAft>
+              <a:buFont typeface="Arial" panose="020B0604020202020204" pitchFamily="34" charset="0"/>
+              <a:buChar char="•"/>
+            </a:pPr>
+            <a:r>
+              <a:rPr lang="it-IT" sz="800" dirty="0">
+                <a:solidFill>
+                  <a:srgbClr val="5A6772"/>
+                </a:solidFill>
+                <a:latin typeface="Titillium Web"/>
+                <a:ea typeface="Titillium Web"/>
+                <a:cs typeface="Titillium Web"/>
+                <a:sym typeface="Titillium Web"/>
+              </a:rPr>
+              <a:t>Selezionare «Carer service-aziende»</a:t>
+            </a:r>
+          </a:p>
+          <a:p>
+            <a:pPr marL="171450" lvl="0" indent="-171450" algn="l" rtl="0">
+              <a:spcBef>
+                <a:spcPts val="0"/>
+              </a:spcBef>
+              <a:spcAft>
+                <a:spcPts val="0"/>
+              </a:spcAft>
+              <a:buFont typeface="Arial" panose="020B0604020202020204" pitchFamily="34" charset="0"/>
+              <a:buChar char="•"/>
+            </a:pPr>
+            <a:r>
+              <a:rPr lang="it-IT" sz="800" dirty="0">
+                <a:solidFill>
+                  <a:srgbClr val="5A6772"/>
+                </a:solidFill>
+                <a:latin typeface="Titillium Web"/>
+                <a:ea typeface="Titillium Web"/>
+                <a:cs typeface="Titillium Web"/>
+                <a:sym typeface="Titillium Web"/>
+              </a:rPr>
+              <a:t>Cliccare «Carer service per le aziende»</a:t>
+            </a:r>
+          </a:p>
+          <a:p>
+            <a:pPr marL="0" lvl="0" indent="0" algn="l" rtl="0">
+              <a:spcBef>
+                <a:spcPts val="0"/>
+              </a:spcBef>
+              <a:spcAft>
+                <a:spcPts val="0"/>
+              </a:spcAft>
+              <a:buNone/>
+            </a:pPr>
+            <a:endParaRPr sz="900" dirty="0">
               <a:solidFill>
                 <a:srgbClr val="5A6772"/>
               </a:solidFill>
@@ -15085,7 +15357,7 @@
               </a:spcAft>
               <a:buNone/>
             </a:pPr>
-            <a:endParaRPr sz="900">
+            <a:endParaRPr sz="900" dirty="0">
               <a:solidFill>
                 <a:srgbClr val="5A6772"/>
               </a:solidFill>
@@ -15135,7 +15407,7 @@
               <a:buNone/>
             </a:pPr>
             <a:r>
-              <a:rPr lang="it" sz="1000" b="1">
+              <a:rPr lang="it" sz="1000" b="1" dirty="0">
                 <a:solidFill>
                   <a:srgbClr val="00B8CD"/>
                 </a:solidFill>
@@ -15146,7 +15418,7 @@
               </a:rPr>
               <a:t>CRITERIO DI SUCCESSO 2**</a:t>
             </a:r>
-            <a:endParaRPr sz="1000" b="1">
+            <a:endParaRPr sz="1000" b="1" dirty="0">
               <a:solidFill>
                 <a:srgbClr val="00B8CD"/>
               </a:solidFill>
@@ -15169,7 +15441,7 @@
               </a:spcAft>
               <a:buNone/>
             </a:pPr>
-            <a:endParaRPr sz="1000" b="1">
+            <a:endParaRPr sz="1000" b="1" dirty="0">
               <a:solidFill>
                 <a:srgbClr val="00B8CD"/>
               </a:solidFill>
@@ -15192,7 +15464,7 @@
               </a:spcAft>
               <a:buNone/>
             </a:pPr>
-            <a:endParaRPr sz="1000">
+            <a:endParaRPr sz="1000" dirty="0">
               <a:solidFill>
                 <a:srgbClr val="5A6772"/>
               </a:solidFill>
@@ -15229,38 +15501,67 @@
           </a:bodyPr>
           <a:lstStyle/>
           <a:p>
-            <a:pPr marL="0" lvl="0" indent="0" algn="l" rtl="0">
-              <a:spcBef>
-                <a:spcPts val="0"/>
-              </a:spcBef>
-              <a:spcAft>
-                <a:spcPts val="0"/>
-              </a:spcAft>
-              <a:buNone/>
+            <a:pPr marL="171450" lvl="0" indent="-171450" algn="l" rtl="0">
+              <a:spcBef>
+                <a:spcPts val="0"/>
+              </a:spcBef>
+              <a:spcAft>
+                <a:spcPts val="0"/>
+              </a:spcAft>
+              <a:buFont typeface="Arial" panose="020B0604020202020204" pitchFamily="34" charset="0"/>
+              <a:buChar char="•"/>
             </a:pPr>
             <a:r>
-              <a:rPr lang="it" sz="900">
-                <a:solidFill>
-                  <a:srgbClr val="5A6772"/>
-                </a:solidFill>
-                <a:latin typeface="Titillium Web"/>
-                <a:ea typeface="Titillium Web"/>
-                <a:cs typeface="Titillium Web"/>
-                <a:sym typeface="Titillium Web"/>
+              <a:rPr lang="it-IT" sz="800" u="sng" dirty="0">
+                <a:solidFill>
+                  <a:srgbClr val="0000FF"/>
+                </a:solidFill>
+                <a:effectLst/>
+                <a:latin typeface="Arial" panose="020B0604020202020204" pitchFamily="34" charset="0"/>
+                <a:ea typeface="Calibri" panose="020F0502020204030204" pitchFamily="34" charset="0"/>
+                <a:cs typeface="Cambria" panose="02040503050406030204" pitchFamily="18" charset="0"/>
+                <a:hlinkClick r:id="rId7"/>
               </a:rPr>
-              <a:t>Descrivi qui il criterio di successo….</a:t>
+              <a:t>https://www.unifi.it/vp-7464-erasmus-e-mobilita-internazionale.html</a:t>
             </a:r>
-            <a:endParaRPr sz="900">
+            <a:endParaRPr lang="it-IT" sz="800" u="sng" dirty="0">
               <a:solidFill>
-                <a:srgbClr val="5A6772"/>
+                <a:srgbClr val="0000FF"/>
               </a:solidFill>
-              <a:latin typeface="Titillium Web SemiBold"/>
-              <a:ea typeface="Titillium Web SemiBold"/>
-              <a:cs typeface="Titillium Web SemiBold"/>
-              <a:sym typeface="Titillium Web SemiBold"/>
+              <a:effectLst/>
+              <a:latin typeface="Arial" panose="020B0604020202020204" pitchFamily="34" charset="0"/>
+              <a:ea typeface="Calibri" panose="020F0502020204030204" pitchFamily="34" charset="0"/>
+              <a:cs typeface="Cambria" panose="02040503050406030204" pitchFamily="18" charset="0"/>
             </a:endParaRPr>
           </a:p>
           <a:p>
+            <a:pPr marL="171450" indent="-171450">
+              <a:lnSpc>
+                <a:spcPct val="115000"/>
+              </a:lnSpc>
+              <a:buFont typeface="Arial" panose="020B0604020202020204" pitchFamily="34" charset="0"/>
+              <a:buChar char="•"/>
+            </a:pPr>
+            <a:r>
+              <a:rPr lang="it-IT" sz="800" u="sng" dirty="0">
+                <a:solidFill>
+                  <a:srgbClr val="0000FF"/>
+                </a:solidFill>
+                <a:effectLst/>
+                <a:latin typeface="Titillium Web" panose="00000500000000000000" pitchFamily="2" charset="0"/>
+                <a:ea typeface="Titillium Web" panose="00000500000000000000" pitchFamily="2" charset="0"/>
+                <a:cs typeface="Titillium Web" panose="00000500000000000000" pitchFamily="2" charset="0"/>
+                <a:hlinkClick r:id="rId8"/>
+              </a:rPr>
+              <a:t>https://www.unifi.it/cmpro-v-p-10034.html#erasmus_studio</a:t>
+            </a:r>
+            <a:endParaRPr lang="it-IT" sz="800" dirty="0">
+              <a:effectLst/>
+              <a:latin typeface="Arial" panose="020B0604020202020204" pitchFamily="34" charset="0"/>
+              <a:ea typeface="Arial" panose="020B0604020202020204" pitchFamily="34" charset="0"/>
+            </a:endParaRPr>
+          </a:p>
+          <a:p>
             <a:pPr marL="0" lvl="0" indent="0" algn="l" rtl="0">
               <a:spcBef>
                 <a:spcPts val="0"/>
@@ -15270,7 +15571,7 @@
               </a:spcAft>
               <a:buNone/>
             </a:pPr>
-            <a:endParaRPr sz="900">
+            <a:endParaRPr sz="900" dirty="0">
               <a:solidFill>
                 <a:srgbClr val="5A6772"/>
               </a:solidFill>
@@ -15320,7 +15621,7 @@
               <a:buNone/>
             </a:pPr>
             <a:r>
-              <a:rPr lang="it" sz="1000" b="1">
+              <a:rPr lang="it" sz="1000" b="1" dirty="0">
                 <a:solidFill>
                   <a:srgbClr val="00B8CD"/>
                 </a:solidFill>
@@ -15331,7 +15632,7 @@
               </a:rPr>
               <a:t>CRITERIO DI SUCCESSO 1*</a:t>
             </a:r>
-            <a:endParaRPr sz="1000" b="1">
+            <a:endParaRPr sz="1000" b="1" dirty="0">
               <a:solidFill>
                 <a:srgbClr val="00B8CD"/>
               </a:solidFill>
@@ -15354,7 +15655,7 @@
               </a:spcAft>
               <a:buNone/>
             </a:pPr>
-            <a:endParaRPr sz="1000" b="1">
+            <a:endParaRPr sz="1000" b="1" dirty="0">
               <a:solidFill>
                 <a:srgbClr val="00B8CD"/>
               </a:solidFill>
@@ -15377,7 +15678,7 @@
               </a:spcAft>
               <a:buNone/>
             </a:pPr>
-            <a:endParaRPr sz="1000">
+            <a:endParaRPr sz="1000" dirty="0">
               <a:solidFill>
                 <a:srgbClr val="5A6772"/>
               </a:solidFill>
@@ -15508,7 +15809,7 @@
               <a:buNone/>
             </a:pPr>
             <a:r>
-              <a:rPr lang="it" sz="900">
+              <a:rPr lang="it-IT" sz="800" dirty="0">
                 <a:solidFill>
                   <a:srgbClr val="5A6772"/>
                 </a:solidFill>
@@ -15517,9 +15818,91 @@
                 <a:cs typeface="Titillium Web"/>
                 <a:sym typeface="Titillium Web"/>
               </a:rPr>
-              <a:t>Descrivi qui il criterio di successo….</a:t>
+              <a:t>Possibile sequenza di operazioni per arrivare alla soluzione dalla</a:t>
             </a:r>
-            <a:endParaRPr sz="900">
+          </a:p>
+          <a:p>
+            <a:pPr marL="0" lvl="0" indent="0" algn="l" rtl="0">
+              <a:spcBef>
+                <a:spcPts val="0"/>
+              </a:spcBef>
+              <a:spcAft>
+                <a:spcPts val="0"/>
+              </a:spcAft>
+              <a:buNone/>
+            </a:pPr>
+            <a:r>
+              <a:rPr lang="it-IT" sz="800" dirty="0">
+                <a:solidFill>
+                  <a:srgbClr val="5A6772"/>
+                </a:solidFill>
+                <a:latin typeface="Titillium Web"/>
+                <a:ea typeface="Titillium Web"/>
+                <a:cs typeface="Titillium Web"/>
+                <a:sym typeface="Titillium Web"/>
+              </a:rPr>
+              <a:t>Homepage:</a:t>
+            </a:r>
+          </a:p>
+          <a:p>
+            <a:pPr marL="171450" lvl="0" indent="-171450" algn="l" rtl="0">
+              <a:spcBef>
+                <a:spcPts val="0"/>
+              </a:spcBef>
+              <a:spcAft>
+                <a:spcPts val="0"/>
+              </a:spcAft>
+              <a:buFont typeface="Arial" panose="020B0604020202020204" pitchFamily="34" charset="0"/>
+              <a:buChar char="•"/>
+            </a:pPr>
+            <a:r>
+              <a:rPr lang="it-IT" sz="800" dirty="0">
+                <a:solidFill>
+                  <a:srgbClr val="5A6772"/>
+                </a:solidFill>
+                <a:latin typeface="Titillium Web"/>
+                <a:ea typeface="Titillium Web"/>
+                <a:cs typeface="Titillium Web"/>
+                <a:sym typeface="Titillium Web"/>
+              </a:rPr>
+              <a:t>Cliccare la voce del menu «Internazionalizzazione»</a:t>
+            </a:r>
+          </a:p>
+          <a:p>
+            <a:pPr marL="171450" lvl="0" indent="-171450" algn="l" rtl="0">
+              <a:spcBef>
+                <a:spcPts val="0"/>
+              </a:spcBef>
+              <a:spcAft>
+                <a:spcPts val="0"/>
+              </a:spcAft>
+              <a:buFont typeface="Arial" panose="020B0604020202020204" pitchFamily="34" charset="0"/>
+              <a:buChar char="•"/>
+            </a:pPr>
+            <a:r>
+              <a:rPr lang="it-IT" sz="800" dirty="0">
+                <a:solidFill>
+                  <a:srgbClr val="5A6772"/>
+                </a:solidFill>
+                <a:latin typeface="Titillium Web"/>
+                <a:ea typeface="Titillium Web"/>
+                <a:cs typeface="Titillium Web"/>
+                <a:sym typeface="Titillium Web"/>
+              </a:rPr>
+              <a:t>Selezionare la voce del menu «Erasmus e mobilità internazionale»</a:t>
+            </a:r>
+          </a:p>
+          <a:p>
+            <a:pPr marL="0" lvl="0" indent="0" algn="l" rtl="0">
+              <a:spcBef>
+                <a:spcPts val="0"/>
+              </a:spcBef>
+              <a:spcAft>
+                <a:spcPts val="0"/>
+              </a:spcAft>
+              <a:buNone/>
+            </a:pPr>
+            <a:endParaRPr sz="800" dirty="0">
               <a:solidFill>
                 <a:srgbClr val="5A6772"/>
               </a:solidFill>
@@ -15539,7 +15922,7 @@
               </a:spcAft>
               <a:buNone/>
             </a:pPr>
-            <a:endParaRPr sz="900">
+            <a:endParaRPr sz="900" dirty="0">
               <a:solidFill>
                 <a:srgbClr val="5A6772"/>
               </a:solidFill>
@@ -15795,7 +16178,7 @@
           <p:nvPr/>
         </p:nvPicPr>
         <p:blipFill rotWithShape="1">
-          <a:blip r:embed="rId3">
+          <a:blip r:embed="rId9">
             <a:alphaModFix/>
           </a:blip>
           <a:srcRect/>
@@ -16325,35 +16708,72 @@
           </a:bodyPr>
           <a:lstStyle/>
           <a:p>
-            <a:pPr marL="0" lvl="0" indent="0" algn="l" rtl="0">
-              <a:spcBef>
-                <a:spcPts val="0"/>
-              </a:spcBef>
-              <a:spcAft>
-                <a:spcPts val="0"/>
-              </a:spcAft>
-              <a:buNone/>
+            <a:pPr marL="171450" indent="-171450">
+              <a:lnSpc>
+                <a:spcPct val="115000"/>
+              </a:lnSpc>
+              <a:buFont typeface="Arial" panose="020B0604020202020204" pitchFamily="34" charset="0"/>
+              <a:buChar char="•"/>
             </a:pPr>
             <a:r>
-              <a:rPr lang="it" sz="900">
-                <a:solidFill>
-                  <a:srgbClr val="5A6772"/>
-                </a:solidFill>
-                <a:latin typeface="Titillium Web"/>
-                <a:ea typeface="Titillium Web"/>
-                <a:cs typeface="Titillium Web"/>
-                <a:sym typeface="Titillium Web"/>
+              <a:rPr lang="it-IT" sz="800" u="sng" dirty="0">
+                <a:solidFill>
+                  <a:srgbClr val="0000FF"/>
+                </a:solidFill>
+                <a:effectLst/>
+                <a:latin typeface="Arial" panose="020B0604020202020204" pitchFamily="34" charset="0"/>
+                <a:ea typeface="Calibri" panose="020F0502020204030204" pitchFamily="34" charset="0"/>
+                <a:cs typeface="Cambria" panose="02040503050406030204" pitchFamily="18" charset="0"/>
+                <a:hlinkClick r:id="rId3"/>
               </a:rPr>
-              <a:t>Descrivi qui il criterio di successo….</a:t>
+              <a:t>https://www.unifi.it/cmpro-v-p-9472.html#uno</a:t>
             </a:r>
-            <a:endParaRPr sz="900">
+            <a:endParaRPr lang="it-IT" sz="800" u="sng" dirty="0">
               <a:solidFill>
-                <a:srgbClr val="5A6772"/>
+                <a:srgbClr val="0000FF"/>
               </a:solidFill>
-              <a:latin typeface="Titillium Web SemiBold"/>
-              <a:ea typeface="Titillium Web SemiBold"/>
-              <a:cs typeface="Titillium Web SemiBold"/>
-              <a:sym typeface="Titillium Web SemiBold"/>
+              <a:effectLst/>
+              <a:latin typeface="Arial" panose="020B0604020202020204" pitchFamily="34" charset="0"/>
+              <a:ea typeface="Calibri" panose="020F0502020204030204" pitchFamily="34" charset="0"/>
+              <a:cs typeface="Cambria" panose="02040503050406030204" pitchFamily="18" charset="0"/>
+            </a:endParaRPr>
+          </a:p>
+          <a:p>
+            <a:pPr marL="171450" indent="-171450">
+              <a:lnSpc>
+                <a:spcPct val="115000"/>
+              </a:lnSpc>
+              <a:buFont typeface="Arial" panose="020B0604020202020204" pitchFamily="34" charset="0"/>
+              <a:buChar char="•"/>
+            </a:pPr>
+            <a:r>
+              <a:rPr lang="it-IT" sz="800" u="sng" dirty="0">
+                <a:solidFill>
+                  <a:srgbClr val="0000FF"/>
+                </a:solidFill>
+                <a:effectLst/>
+                <a:latin typeface="Arial" panose="020B0604020202020204" pitchFamily="34" charset="0"/>
+                <a:ea typeface="Arial" panose="020B0604020202020204" pitchFamily="34" charset="0"/>
+                <a:hlinkClick r:id="rId4"/>
+              </a:rPr>
+              <a:t>https://www.unifi.it/vp-7376-faq-come-fare-per.html#laureandi</a:t>
+            </a:r>
+            <a:endParaRPr lang="it-IT" sz="800" dirty="0">
+              <a:effectLst/>
+              <a:latin typeface="Arial" panose="020B0604020202020204" pitchFamily="34" charset="0"/>
+              <a:ea typeface="Arial" panose="020B0604020202020204" pitchFamily="34" charset="0"/>
+            </a:endParaRPr>
+          </a:p>
+          <a:p>
+            <a:pPr>
+              <a:lnSpc>
+                <a:spcPct val="115000"/>
+              </a:lnSpc>
+            </a:pPr>
+            <a:endParaRPr lang="it-IT" sz="800" dirty="0">
+              <a:effectLst/>
+              <a:latin typeface="Arial" panose="020B0604020202020204" pitchFamily="34" charset="0"/>
+              <a:ea typeface="Arial" panose="020B0604020202020204" pitchFamily="34" charset="0"/>
             </a:endParaRPr>
           </a:p>
         </p:txBody>
@@ -16561,7 +16981,7 @@
               <a:buNone/>
             </a:pPr>
             <a:r>
-              <a:rPr lang="it" sz="900">
+              <a:rPr lang="it-IT" sz="800" dirty="0">
                 <a:solidFill>
                   <a:srgbClr val="5A6772"/>
                 </a:solidFill>
@@ -16570,9 +16990,140 @@
                 <a:cs typeface="Titillium Web"/>
                 <a:sym typeface="Titillium Web"/>
               </a:rPr>
-              <a:t>Descrivi qui il criterio di successo….</a:t>
+              <a:t>Possibile sequenza di operazioni per arrivare alla soluzione dalla</a:t>
             </a:r>
-            <a:endParaRPr sz="900">
+          </a:p>
+          <a:p>
+            <a:pPr marL="0" lvl="0" indent="0" algn="l" rtl="0">
+              <a:spcBef>
+                <a:spcPts val="0"/>
+              </a:spcBef>
+              <a:spcAft>
+                <a:spcPts val="0"/>
+              </a:spcAft>
+              <a:buNone/>
+            </a:pPr>
+            <a:r>
+              <a:rPr lang="it-IT" sz="800" dirty="0">
+                <a:solidFill>
+                  <a:srgbClr val="5A6772"/>
+                </a:solidFill>
+                <a:latin typeface="Titillium Web"/>
+                <a:ea typeface="Titillium Web"/>
+                <a:cs typeface="Titillium Web"/>
+                <a:sym typeface="Titillium Web"/>
+              </a:rPr>
+              <a:t>Homepage:</a:t>
+            </a:r>
+          </a:p>
+          <a:p>
+            <a:pPr marL="171450" lvl="0" indent="-171450" algn="l" rtl="0">
+              <a:spcBef>
+                <a:spcPts val="0"/>
+              </a:spcBef>
+              <a:spcAft>
+                <a:spcPts val="0"/>
+              </a:spcAft>
+              <a:buFont typeface="Arial" panose="020B0604020202020204" pitchFamily="34" charset="0"/>
+              <a:buChar char="•"/>
+            </a:pPr>
+            <a:r>
+              <a:rPr lang="it" sz="800" dirty="0">
+                <a:solidFill>
+                  <a:srgbClr val="5A6772"/>
+                </a:solidFill>
+                <a:latin typeface="Titillium Web"/>
+                <a:ea typeface="Titillium Web SemiBold"/>
+                <a:cs typeface="Titillium Web SemiBold"/>
+                <a:sym typeface="Titillium Web"/>
+              </a:rPr>
+              <a:t>Cliccare la voce del menu «Iscrizioni»</a:t>
+            </a:r>
+          </a:p>
+          <a:p>
+            <a:pPr marL="171450" lvl="0" indent="-171450" algn="l" rtl="0">
+              <a:spcBef>
+                <a:spcPts val="0"/>
+              </a:spcBef>
+              <a:spcAft>
+                <a:spcPts val="0"/>
+              </a:spcAft>
+              <a:buFont typeface="Arial" panose="020B0604020202020204" pitchFamily="34" charset="0"/>
+              <a:buChar char="•"/>
+            </a:pPr>
+            <a:r>
+              <a:rPr lang="it-IT" sz="800" dirty="0">
+                <a:solidFill>
+                  <a:srgbClr val="5A6772"/>
+                </a:solidFill>
+                <a:latin typeface="Titillium Web"/>
+                <a:ea typeface="Titillium Web SemiBold"/>
+                <a:cs typeface="Titillium Web SemiBold"/>
+                <a:sym typeface="Titillium Web"/>
+              </a:rPr>
+              <a:t>S</a:t>
+            </a:r>
+            <a:r>
+              <a:rPr lang="it" sz="800" dirty="0">
+                <a:solidFill>
+                  <a:srgbClr val="5A6772"/>
+                </a:solidFill>
+                <a:latin typeface="Titillium Web"/>
+                <a:ea typeface="Titillium Web SemiBold"/>
+                <a:cs typeface="Titillium Web SemiBold"/>
+                <a:sym typeface="Titillium Web"/>
+              </a:rPr>
+              <a:t>elezionare «Faq| Come fare per»</a:t>
+            </a:r>
+          </a:p>
+          <a:p>
+            <a:pPr marL="171450" lvl="0" indent="-171450" algn="l" rtl="0">
+              <a:spcBef>
+                <a:spcPts val="0"/>
+              </a:spcBef>
+              <a:spcAft>
+                <a:spcPts val="0"/>
+              </a:spcAft>
+              <a:buFont typeface="Arial" panose="020B0604020202020204" pitchFamily="34" charset="0"/>
+              <a:buChar char="•"/>
+            </a:pPr>
+            <a:r>
+              <a:rPr lang="it" sz="800" dirty="0">
+                <a:solidFill>
+                  <a:srgbClr val="5A6772"/>
+                </a:solidFill>
+                <a:latin typeface="Titillium Web"/>
+                <a:ea typeface="Titillium Web SemiBold"/>
+                <a:cs typeface="Titillium Web SemiBold"/>
+                <a:sym typeface="Titillium Web"/>
+              </a:rPr>
+              <a:t>Scorrere la pagina fino a «Tutte le faq divise per argomento» e cliccare «Tesi di laurea»</a:t>
+            </a:r>
+          </a:p>
+          <a:p>
+            <a:pPr marL="171450" lvl="0" indent="-171450" algn="l" rtl="0">
+              <a:spcBef>
+                <a:spcPts val="0"/>
+              </a:spcBef>
+              <a:spcAft>
+                <a:spcPts val="0"/>
+              </a:spcAft>
+              <a:buFont typeface="Arial" panose="020B0604020202020204" pitchFamily="34" charset="0"/>
+              <a:buChar char="•"/>
+            </a:pPr>
+            <a:r>
+              <a:rPr lang="it" sz="800" dirty="0">
+                <a:solidFill>
+                  <a:srgbClr val="5A6772"/>
+                </a:solidFill>
+                <a:latin typeface="Titillium Web"/>
+                <a:ea typeface="Titillium Web SemiBold"/>
+                <a:cs typeface="Titillium Web SemiBold"/>
+                <a:sym typeface="Titillium Web"/>
+              </a:rPr>
+              <a:t>Selezionare la domanda «A chi mi posso rivolgere per informazioni presentazione della dom,anda di tesi»</a:t>
+            </a:r>
+            <a:endParaRPr sz="800" dirty="0">
               <a:solidFill>
                 <a:srgbClr val="5A6772"/>
               </a:solidFill>
@@ -16592,7 +17143,7 @@
               </a:spcAft>
               <a:buNone/>
             </a:pPr>
-            <a:endParaRPr sz="900">
+            <a:endParaRPr sz="900" dirty="0">
               <a:solidFill>
                 <a:srgbClr val="5A6772"/>
               </a:solidFill>
@@ -16739,26 +17290,28 @@
           </a:bodyPr>
           <a:lstStyle/>
           <a:p>
-            <a:pPr marL="0" lvl="0" indent="0" algn="l" rtl="0">
-              <a:spcBef>
-                <a:spcPts val="0"/>
-              </a:spcBef>
-              <a:spcAft>
-                <a:spcPts val="0"/>
-              </a:spcAft>
-              <a:buNone/>
+            <a:pPr marL="171450" lvl="0" indent="-171450" algn="l" rtl="0">
+              <a:spcBef>
+                <a:spcPts val="0"/>
+              </a:spcBef>
+              <a:spcAft>
+                <a:spcPts val="0"/>
+              </a:spcAft>
+              <a:buFont typeface="Arial" panose="020B0604020202020204" pitchFamily="34" charset="0"/>
+              <a:buChar char="•"/>
             </a:pPr>
             <a:r>
-              <a:rPr lang="it" sz="900" dirty="0">
-                <a:solidFill>
-                  <a:srgbClr val="5A6772"/>
-                </a:solidFill>
-                <a:latin typeface="Titillium Web"/>
-                <a:ea typeface="Titillium Web"/>
-                <a:cs typeface="Titillium Web"/>
-                <a:sym typeface="Titillium Web"/>
+              <a:rPr lang="it-IT" sz="900" u="sng" dirty="0">
+                <a:solidFill>
+                  <a:srgbClr val="0000FF"/>
+                </a:solidFill>
+                <a:effectLst/>
+                <a:latin typeface="Titillium Web" panose="00000500000000000000" pitchFamily="2" charset="0"/>
+                <a:ea typeface="Titillium Web" panose="00000500000000000000" pitchFamily="2" charset="0"/>
+                <a:cs typeface="Titillium Web" panose="00000500000000000000" pitchFamily="2" charset="0"/>
+                <a:hlinkClick r:id="rId5"/>
               </a:rPr>
-              <a:t>Descrivi qui il criterio di successo….</a:t>
+              <a:t>https://www.unifi.it/vp-379-studenti-con-disabilita-o-dsa.html</a:t>
             </a:r>
             <a:endParaRPr sz="900" dirty="0">
               <a:solidFill>
@@ -16768,26 +17321,6 @@
               <a:ea typeface="Titillium Web SemiBold"/>
               <a:cs typeface="Titillium Web SemiBold"/>
               <a:sym typeface="Titillium Web SemiBold"/>
-            </a:endParaRPr>
-          </a:p>
-          <a:p>
-            <a:pPr marL="0" lvl="0" indent="0" algn="l" rtl="0">
-              <a:spcBef>
-                <a:spcPts val="0"/>
-              </a:spcBef>
-              <a:spcAft>
-                <a:spcPts val="0"/>
-              </a:spcAft>
-              <a:buNone/>
-            </a:pPr>
-            <a:endParaRPr sz="900" dirty="0">
-              <a:solidFill>
-                <a:srgbClr val="5A6772"/>
-              </a:solidFill>
-              <a:latin typeface="Titillium Web"/>
-              <a:ea typeface="Titillium Web"/>
-              <a:cs typeface="Titillium Web"/>
-              <a:sym typeface="Titillium Web"/>
             </a:endParaRPr>
           </a:p>
         </p:txBody>
@@ -16830,7 +17363,7 @@
               <a:buNone/>
             </a:pPr>
             <a:r>
-              <a:rPr lang="it" sz="1000" b="1">
+              <a:rPr lang="it" sz="1000" b="1" dirty="0">
                 <a:solidFill>
                   <a:srgbClr val="00B8CD"/>
                 </a:solidFill>
@@ -16841,7 +17374,7 @@
               </a:rPr>
               <a:t>CRITERIO DI SUCCESSO 1*</a:t>
             </a:r>
-            <a:endParaRPr sz="1000" b="1">
+            <a:endParaRPr sz="1000" b="1" dirty="0">
               <a:solidFill>
                 <a:srgbClr val="00B8CD"/>
               </a:solidFill>
@@ -16864,7 +17397,7 @@
               </a:spcAft>
               <a:buNone/>
             </a:pPr>
-            <a:endParaRPr sz="1000" b="1">
+            <a:endParaRPr sz="1000" b="1" dirty="0">
               <a:solidFill>
                 <a:srgbClr val="00B8CD"/>
               </a:solidFill>
@@ -16887,7 +17420,7 @@
               </a:spcAft>
               <a:buNone/>
             </a:pPr>
-            <a:endParaRPr sz="1000">
+            <a:endParaRPr sz="1000" dirty="0">
               <a:solidFill>
                 <a:srgbClr val="5A6772"/>
               </a:solidFill>
@@ -17018,7 +17551,7 @@
               <a:buNone/>
             </a:pPr>
             <a:r>
-              <a:rPr lang="it" sz="900">
+              <a:rPr lang="it-IT" sz="800" dirty="0">
                 <a:solidFill>
                   <a:srgbClr val="5A6772"/>
                 </a:solidFill>
@@ -17027,9 +17560,92 @@
                 <a:cs typeface="Titillium Web"/>
                 <a:sym typeface="Titillium Web"/>
               </a:rPr>
-              <a:t>Descrivi qui il criterio di successo….</a:t>
+              <a:t>Possibile sequenza di operazioni per arrivare alla soluzione dalla</a:t>
             </a:r>
-            <a:endParaRPr sz="900">
+          </a:p>
+          <a:p>
+            <a:pPr marL="0" lvl="0" indent="0" algn="l" rtl="0">
+              <a:spcBef>
+                <a:spcPts val="0"/>
+              </a:spcBef>
+              <a:spcAft>
+                <a:spcPts val="0"/>
+              </a:spcAft>
+              <a:buNone/>
+            </a:pPr>
+            <a:r>
+              <a:rPr lang="it-IT" sz="800" dirty="0">
+                <a:solidFill>
+                  <a:srgbClr val="5A6772"/>
+                </a:solidFill>
+                <a:latin typeface="Titillium Web"/>
+                <a:ea typeface="Titillium Web"/>
+                <a:cs typeface="Titillium Web"/>
+                <a:sym typeface="Titillium Web"/>
+              </a:rPr>
+              <a:t>Homepage:</a:t>
+            </a:r>
+          </a:p>
+          <a:p>
+            <a:pPr marL="171450" lvl="0" indent="-171450" algn="l" rtl="0">
+              <a:spcBef>
+                <a:spcPts val="0"/>
+              </a:spcBef>
+              <a:spcAft>
+                <a:spcPts val="0"/>
+              </a:spcAft>
+              <a:buFont typeface="Arial" panose="020B0604020202020204" pitchFamily="34" charset="0"/>
+              <a:buChar char="•"/>
+            </a:pPr>
+            <a:r>
+              <a:rPr lang="it" sz="800" dirty="0">
+                <a:solidFill>
+                  <a:srgbClr val="5A6772"/>
+                </a:solidFill>
+                <a:latin typeface="Titillium Web"/>
+                <a:ea typeface="Titillium Web SemiBold"/>
+                <a:cs typeface="Titillium Web SemiBold"/>
+                <a:sym typeface="Titillium Web"/>
+              </a:rPr>
+              <a:t>Cliccare la voce del menu «Iscrizioni»</a:t>
+            </a:r>
+          </a:p>
+          <a:p>
+            <a:pPr marL="171450" lvl="0" indent="-171450" algn="l" rtl="0">
+              <a:spcBef>
+                <a:spcPts val="0"/>
+              </a:spcBef>
+              <a:spcAft>
+                <a:spcPts val="0"/>
+              </a:spcAft>
+              <a:buFont typeface="Arial" panose="020B0604020202020204" pitchFamily="34" charset="0"/>
+              <a:buChar char="•"/>
+            </a:pPr>
+            <a:r>
+              <a:rPr lang="it-IT" sz="800" dirty="0">
+                <a:solidFill>
+                  <a:srgbClr val="5A6772"/>
+                </a:solidFill>
+                <a:latin typeface="Titillium Web"/>
+                <a:ea typeface="Titillium Web SemiBold"/>
+                <a:cs typeface="Titillium Web SemiBold"/>
+                <a:sym typeface="Titillium Web"/>
+              </a:rPr>
+              <a:t>S</a:t>
+            </a:r>
+            <a:r>
+              <a:rPr lang="it" sz="800" dirty="0">
+                <a:solidFill>
+                  <a:srgbClr val="5A6772"/>
+                </a:solidFill>
+                <a:latin typeface="Titillium Web"/>
+                <a:ea typeface="Titillium Web SemiBold"/>
+                <a:cs typeface="Titillium Web SemiBold"/>
+                <a:sym typeface="Titillium Web"/>
+              </a:rPr>
+              <a:t>elezionare la voce «Stuenti con disabilità o DSA»</a:t>
+            </a:r>
+            <a:endParaRPr sz="800" dirty="0">
               <a:solidFill>
                 <a:srgbClr val="5A6772"/>
               </a:solidFill>
@@ -17037,26 +17653,6 @@
               <a:ea typeface="Titillium Web SemiBold"/>
               <a:cs typeface="Titillium Web SemiBold"/>
               <a:sym typeface="Titillium Web SemiBold"/>
-            </a:endParaRPr>
-          </a:p>
-          <a:p>
-            <a:pPr marL="0" lvl="0" indent="0" algn="l" rtl="0">
-              <a:spcBef>
-                <a:spcPts val="0"/>
-              </a:spcBef>
-              <a:spcAft>
-                <a:spcPts val="0"/>
-              </a:spcAft>
-              <a:buNone/>
-            </a:pPr>
-            <a:endParaRPr sz="900">
-              <a:solidFill>
-                <a:srgbClr val="5A6772"/>
-              </a:solidFill>
-              <a:latin typeface="Titillium Web"/>
-              <a:ea typeface="Titillium Web"/>
-              <a:cs typeface="Titillium Web"/>
-              <a:sym typeface="Titillium Web"/>
             </a:endParaRPr>
           </a:p>
         </p:txBody>
@@ -17099,7 +17695,7 @@
               <a:buNone/>
             </a:pPr>
             <a:r>
-              <a:rPr lang="it" sz="1000" b="1">
+              <a:rPr lang="it" sz="1000" b="1" dirty="0">
                 <a:solidFill>
                   <a:srgbClr val="00B8CD"/>
                 </a:solidFill>
@@ -17110,7 +17706,7 @@
               </a:rPr>
               <a:t>CRITERIO DI SUCCESSO 2**</a:t>
             </a:r>
-            <a:endParaRPr sz="1000" b="1">
+            <a:endParaRPr sz="1000" b="1" dirty="0">
               <a:solidFill>
                 <a:srgbClr val="00B8CD"/>
               </a:solidFill>
@@ -17133,7 +17729,7 @@
               </a:spcAft>
               <a:buNone/>
             </a:pPr>
-            <a:endParaRPr sz="1000" b="1">
+            <a:endParaRPr sz="1000" b="1" dirty="0">
               <a:solidFill>
                 <a:srgbClr val="00B8CD"/>
               </a:solidFill>
@@ -17156,7 +17752,7 @@
               </a:spcAft>
               <a:buNone/>
             </a:pPr>
-            <a:endParaRPr sz="1000">
+            <a:endParaRPr sz="1000" dirty="0">
               <a:solidFill>
                 <a:srgbClr val="5A6772"/>
               </a:solidFill>
@@ -17253,7 +17849,7 @@
           <p:nvPr/>
         </p:nvPicPr>
         <p:blipFill rotWithShape="1">
-          <a:blip r:embed="rId3">
+          <a:blip r:embed="rId6">
             <a:alphaModFix/>
           </a:blip>
           <a:srcRect/>
@@ -17407,11 +18003,17 @@
         <p:nvGraphicFramePr>
           <p:cNvPr id="246" name="Google Shape;246;p35"/>
           <p:cNvGraphicFramePr/>
-          <p:nvPr/>
+          <p:nvPr>
+            <p:extLst>
+              <p:ext uri="{D42A27DB-BD31-4B8C-83A1-F6EECF244321}">
+                <p14:modId xmlns:p14="http://schemas.microsoft.com/office/powerpoint/2010/main" val="3168361565"/>
+              </p:ext>
+            </p:extLst>
+          </p:nvPr>
         </p:nvGraphicFramePr>
         <p:xfrm>
           <a:off x="420975" y="888225"/>
-          <a:ext cx="7995600" cy="3185130"/>
+          <a:ext cx="7995600" cy="3672720"/>
         </p:xfrm>
         <a:graphic>
           <a:graphicData uri="http://schemas.openxmlformats.org/drawingml/2006/table">
@@ -17765,18 +18367,9 @@
                         <a:buNone/>
                       </a:pPr>
                       <a:r>
-                        <a:rPr lang="it" sz="900">
-                          <a:solidFill>
-                            <a:srgbClr val="5A6772"/>
-                          </a:solidFill>
-                          <a:latin typeface="Titillium Web"/>
-                          <a:ea typeface="Titillium Web"/>
-                          <a:cs typeface="Titillium Web"/>
-                          <a:sym typeface="Titillium Web"/>
-                        </a:rPr>
-                        <a:t>Descrivi qui il problema rilevato...</a:t>
+                        <a:rPr lang="it-IT" sz="900" dirty="0"/>
+                        <a:t>La funzione «Cerca nel sito» non funziona correttamente</a:t>
                       </a:r>
-                      <a:endParaRPr/>
                     </a:p>
                   </a:txBody>
                   <a:tcPr marL="91425" marR="91425" marT="91425" marB="91425">
@@ -17811,18 +18404,16 @@
                         <a:buNone/>
                       </a:pPr>
                       <a:r>
-                        <a:rPr lang="it" sz="900">
+                        <a:rPr lang="it" sz="900" dirty="0">
                           <a:solidFill>
                             <a:srgbClr val="5A6772"/>
                           </a:solidFill>
                           <a:latin typeface="Titillium Web"/>
-                          <a:ea typeface="Titillium Web"/>
-                          <a:cs typeface="Titillium Web"/>
                           <a:sym typeface="Titillium Web"/>
                         </a:rPr>
-                        <a:t>Descrivi qui la criticità...</a:t>
+                        <a:t>Molte volte consultare la funzione «Cerca nel sito» non ha fornito infromazioni rilevanti per il compito da completare. Provancando uno spreco di risorse in termine di tempo e frustazione nell’uso dell’applicazione.</a:t>
                       </a:r>
-                      <a:endParaRPr>
+                      <a:endParaRPr sz="900" dirty="0">
                         <a:solidFill>
                           <a:schemeClr val="dk1"/>
                         </a:solidFill>
@@ -17843,7 +18434,7 @@
                         <a:buFont typeface="Arial"/>
                         <a:buNone/>
                       </a:pPr>
-                      <a:endParaRPr sz="900">
+                      <a:endParaRPr sz="900" dirty="0">
                         <a:solidFill>
                           <a:srgbClr val="5A6772"/>
                         </a:solidFill>
@@ -17880,7 +18471,7 @@
                     <a:bodyPr/>
                     <a:lstStyle/>
                     <a:p>
-                      <a:pPr marL="0" lvl="0" indent="0" algn="l" rtl="0">
+                      <a:pPr marL="285750" lvl="0" indent="-285750" algn="l" rtl="0">
                         <a:spcBef>
                           <a:spcPts val="0"/>
                         </a:spcBef>
@@ -17891,24 +18482,42 @@
                           <a:schemeClr val="dk1"/>
                         </a:buClr>
                         <a:buSzPts val="1100"/>
-                        <a:buFont typeface="Arial"/>
-                        <a:buNone/>
+                        <a:buFont typeface="Arial" panose="020B0604020202020204" pitchFamily="34" charset="0"/>
+                        <a:buChar char="•"/>
                       </a:pPr>
                       <a:r>
-                        <a:rPr lang="it" sz="900">
+                        <a:rPr lang="it" sz="900" dirty="0">
                           <a:solidFill>
-                            <a:srgbClr val="D9D9D9"/>
+                            <a:schemeClr val="tx1"/>
                           </a:solidFill>
                           <a:latin typeface="Titillium Web"/>
-                          <a:ea typeface="Titillium Web"/>
-                          <a:cs typeface="Titillium Web"/>
                           <a:sym typeface="Titillium Web"/>
                         </a:rPr>
-                        <a:t>(Opzionale) descrivi il principio collegato...</a:t>
+                        <a:t>Flessibilità ed effic</a:t>
                       </a:r>
-                      <a:endParaRPr>
+                      <a:r>
+                        <a:rPr lang="it-IT" sz="900" dirty="0">
+                          <a:solidFill>
+                            <a:schemeClr val="tx1"/>
+                          </a:solidFill>
+                          <a:latin typeface="Titillium Web"/>
+                          <a:sym typeface="Titillium Web"/>
+                        </a:rPr>
+                        <a:t>i</a:t>
+                      </a:r>
+                      <a:r>
+                        <a:rPr lang="it" sz="900" dirty="0">
+                          <a:solidFill>
+                            <a:schemeClr val="tx1"/>
+                          </a:solidFill>
+                          <a:latin typeface="Titillium Web"/>
+                          <a:sym typeface="Titillium Web"/>
+                        </a:rPr>
+                        <a:t>enza d’uso</a:t>
+                      </a:r>
+                      <a:endParaRPr dirty="0">
                         <a:solidFill>
-                          <a:srgbClr val="D9D9D9"/>
+                          <a:schemeClr val="tx1"/>
                         </a:solidFill>
                       </a:endParaRPr>
                     </a:p>
@@ -17927,7 +18536,7 @@
                         <a:buFont typeface="Arial"/>
                         <a:buNone/>
                       </a:pPr>
-                      <a:endParaRPr sz="900">
+                      <a:endParaRPr sz="900" dirty="0">
                         <a:solidFill>
                           <a:srgbClr val="D9D9D9"/>
                         </a:solidFill>
@@ -18007,21 +18616,20 @@
                         <a:buNone/>
                       </a:pPr>
                       <a:r>
-                        <a:rPr lang="it" sz="900">
+                        <a:rPr lang="it" sz="900" dirty="0">
                           <a:solidFill>
-                            <a:srgbClr val="5A6772"/>
+                            <a:schemeClr val="tx1"/>
                           </a:solidFill>
-                          <a:latin typeface="Titillium Web"/>
-                          <a:ea typeface="Titillium Web"/>
-                          <a:cs typeface="Titillium Web"/>
+                          <a:latin typeface="+mj-lt"/>
                           <a:sym typeface="Titillium Web"/>
                         </a:rPr>
-                        <a:t>Descrivi qui il problema rilevato...</a:t>
+                        <a:t>Nomi della barra dei menu non descrivono pienamente ciò che contengono</a:t>
                       </a:r>
-                      <a:endParaRPr>
+                      <a:endParaRPr dirty="0">
                         <a:solidFill>
-                          <a:schemeClr val="dk1"/>
+                          <a:schemeClr val="tx1"/>
                         </a:solidFill>
+                        <a:latin typeface="+mj-lt"/>
                       </a:endParaRPr>
                     </a:p>
                     <a:p>
@@ -18039,7 +18647,7 @@
                         <a:buFont typeface="Arial"/>
                         <a:buNone/>
                       </a:pPr>
-                      <a:endParaRPr sz="900">
+                      <a:endParaRPr sz="900" dirty="0">
                         <a:solidFill>
                           <a:srgbClr val="5A6772"/>
                         </a:solidFill>
@@ -18072,7 +18680,7 @@
                         <a:buNone/>
                       </a:pPr>
                       <a:r>
-                        <a:rPr lang="it" sz="900">
+                        <a:rPr lang="it-IT" sz="900" dirty="0">
                           <a:solidFill>
                             <a:srgbClr val="5A6772"/>
                           </a:solidFill>
@@ -18081,30 +18689,9 @@
                           <a:cs typeface="Titillium Web"/>
                           <a:sym typeface="Titillium Web"/>
                         </a:rPr>
-                        <a:t>Descrivi qui la criticità...</a:t>
+                        <a:t>I partecipanti non sempre riescono a capire che informazioni contiene una voce della barra dei menu solo leggendo il suo nome. Molte volte il partecipante ha dovuto aprire la voce per capire se il contenuto fosse utile per quello che stesse cercando. </a:t>
                       </a:r>
-                      <a:endParaRPr>
-                        <a:solidFill>
-                          <a:schemeClr val="dk1"/>
-                        </a:solidFill>
-                      </a:endParaRPr>
-                    </a:p>
-                    <a:p>
-                      <a:pPr marL="0" lvl="0" indent="0" algn="l" rtl="0">
-                        <a:spcBef>
-                          <a:spcPts val="0"/>
-                        </a:spcBef>
-                        <a:spcAft>
-                          <a:spcPts val="0"/>
-                        </a:spcAft>
-                        <a:buClr>
-                          <a:schemeClr val="dk1"/>
-                        </a:buClr>
-                        <a:buSzPts val="1100"/>
-                        <a:buFont typeface="Arial"/>
-                        <a:buNone/>
-                      </a:pPr>
-                      <a:endParaRPr sz="900">
+                      <a:endParaRPr sz="900" dirty="0">
                         <a:solidFill>
                           <a:srgbClr val="5A6772"/>
                         </a:solidFill>
@@ -18129,7 +18716,7 @@
                         <a:buFont typeface="Arial"/>
                         <a:buNone/>
                       </a:pPr>
-                      <a:endParaRPr sz="900">
+                      <a:endParaRPr sz="900" dirty="0">
                         <a:solidFill>
                           <a:srgbClr val="5A6772"/>
                         </a:solidFill>
@@ -18147,7 +18734,7 @@
                     <a:bodyPr/>
                     <a:lstStyle/>
                     <a:p>
-                      <a:pPr marL="0" lvl="0" indent="0" algn="l" rtl="0">
+                      <a:pPr marL="285750" lvl="0" indent="-285750" algn="l" rtl="0">
                         <a:spcBef>
                           <a:spcPts val="0"/>
                         </a:spcBef>
@@ -18158,24 +18745,48 @@
                           <a:schemeClr val="dk1"/>
                         </a:buClr>
                         <a:buSzPts val="1100"/>
-                        <a:buFont typeface="Arial"/>
-                        <a:buNone/>
+                        <a:buFont typeface="Arial" panose="020B0604020202020204" pitchFamily="34" charset="0"/>
+                        <a:buChar char="•"/>
                       </a:pPr>
                       <a:r>
-                        <a:rPr lang="it" sz="900">
+                        <a:rPr lang="it" sz="900" dirty="0">
                           <a:solidFill>
-                            <a:srgbClr val="D9D9D9"/>
+                            <a:schemeClr val="tx1"/>
                           </a:solidFill>
                           <a:latin typeface="Titillium Web"/>
-                          <a:ea typeface="Titillium Web"/>
-                          <a:cs typeface="Titillium Web"/>
                           <a:sym typeface="Titillium Web"/>
                         </a:rPr>
-                        <a:t>(Opzionale) descrivi il principio collegato...</a:t>
+                        <a:t>Allineamento tra il mondo del sistema e quello reale</a:t>
                       </a:r>
-                      <a:endParaRPr>
+                    </a:p>
+                    <a:p>
+                      <a:pPr marL="285750" lvl="0" indent="-285750" algn="l" rtl="0">
+                        <a:spcBef>
+                          <a:spcPts val="0"/>
+                        </a:spcBef>
+                        <a:spcAft>
+                          <a:spcPts val="0"/>
+                        </a:spcAft>
+                        <a:buClr>
+                          <a:schemeClr val="dk1"/>
+                        </a:buClr>
+                        <a:buSzPts val="1100"/>
+                        <a:buFont typeface="Arial" panose="020B0604020202020204" pitchFamily="34" charset="0"/>
+                        <a:buChar char="•"/>
+                      </a:pPr>
+                      <a:r>
+                        <a:rPr lang="it" sz="900" dirty="0">
+                          <a:solidFill>
+                            <a:schemeClr val="tx1"/>
+                          </a:solidFill>
+                          <a:latin typeface="Titillium Web"/>
+                          <a:sym typeface="Titillium Web"/>
+                        </a:rPr>
+                        <a:t>Coerenza e standard </a:t>
+                      </a:r>
+                      <a:endParaRPr dirty="0">
                         <a:solidFill>
-                          <a:srgbClr val="D9D9D9"/>
+                          <a:schemeClr val="tx1"/>
                         </a:solidFill>
                       </a:endParaRPr>
                     </a:p>
@@ -18194,7 +18805,7 @@
                         <a:buFont typeface="Arial"/>
                         <a:buNone/>
                       </a:pPr>
-                      <a:endParaRPr sz="900">
+                      <a:endParaRPr sz="900" dirty="0">
                         <a:solidFill>
                           <a:srgbClr val="D9D9D9"/>
                         </a:solidFill>
@@ -18256,21 +18867,30 @@
                         <a:buNone/>
                       </a:pPr>
                       <a:r>
-                        <a:rPr lang="it" sz="900">
+                        <a:rPr lang="it-IT" sz="900" dirty="0">
                           <a:solidFill>
-                            <a:srgbClr val="5A6772"/>
+                            <a:schemeClr val="tx1"/>
                           </a:solidFill>
-                          <a:latin typeface="Titillium Web"/>
-                          <a:ea typeface="Titillium Web"/>
-                          <a:cs typeface="Titillium Web"/>
+                          <a:latin typeface="+mj-lt"/>
                           <a:sym typeface="Titillium Web"/>
                         </a:rPr>
-                        <a:t>Descrivi qui il problema rilevato...</a:t>
+                        <a:t>Per</a:t>
                       </a:r>
-                      <a:endParaRPr>
+                      <a:r>
+                        <a:rPr lang="it" sz="900" dirty="0">
+                          <a:solidFill>
+                            <a:schemeClr val="tx1"/>
+                          </a:solidFill>
+                          <a:latin typeface="+mj-lt"/>
+                          <a:sym typeface="Titillium Web"/>
+                        </a:rPr>
+                        <a:t> visualizzare il contenuto di una voce della barra dei menu è necessario cliccare</a:t>
+                      </a:r>
+                      <a:endParaRPr dirty="0">
                         <a:solidFill>
-                          <a:schemeClr val="dk1"/>
+                          <a:schemeClr val="tx1"/>
                         </a:solidFill>
+                        <a:latin typeface="+mj-lt"/>
                       </a:endParaRPr>
                     </a:p>
                     <a:p>
@@ -18288,7 +18908,7 @@
                         <a:buFont typeface="Arial"/>
                         <a:buNone/>
                       </a:pPr>
-                      <a:endParaRPr sz="900">
+                      <a:endParaRPr sz="900" dirty="0">
                         <a:solidFill>
                           <a:srgbClr val="5A6772"/>
                         </a:solidFill>
@@ -18321,18 +18941,26 @@
                         <a:buNone/>
                       </a:pPr>
                       <a:r>
-                        <a:rPr lang="it" sz="900">
+                        <a:rPr lang="it-IT" sz="900" dirty="0">
                           <a:solidFill>
                             <a:srgbClr val="5A6772"/>
                           </a:solidFill>
                           <a:latin typeface="Titillium Web"/>
-                          <a:ea typeface="Titillium Web"/>
-                          <a:cs typeface="Titillium Web"/>
                           <a:sym typeface="Titillium Web"/>
                         </a:rPr>
-                        <a:t>Descrivi qui la criticità...</a:t>
+                        <a:t>U</a:t>
                       </a:r>
-                      <a:endParaRPr>
+                      <a:r>
+                        <a:rPr lang="it" sz="900" dirty="0">
+                          <a:solidFill>
+                            <a:srgbClr val="5A6772"/>
+                          </a:solidFill>
+                          <a:latin typeface="Titillium Web"/>
+                          <a:sym typeface="Titillium Web"/>
+                        </a:rPr>
+                        <a:t>n partecipante ha espresso che preferirebbe visualizzare le sotto-voci delle voci della barra dei menu semplicemente passando il cursore sopra una voce, in modo da eseguire una ricerca più veloce.</a:t>
+                      </a:r>
+                      <a:endParaRPr dirty="0">
                         <a:solidFill>
                           <a:schemeClr val="dk1"/>
                         </a:solidFill>
@@ -18353,7 +18981,7 @@
                         <a:buFont typeface="Arial"/>
                         <a:buNone/>
                       </a:pPr>
-                      <a:endParaRPr sz="900">
+                      <a:endParaRPr sz="900" dirty="0">
                         <a:solidFill>
                           <a:srgbClr val="5A6772"/>
                         </a:solidFill>
@@ -18371,7 +18999,7 @@
                     <a:bodyPr/>
                     <a:lstStyle/>
                     <a:p>
-                      <a:pPr marL="0" lvl="0" indent="0" algn="l" rtl="0">
+                      <a:pPr marL="285750" lvl="0" indent="-285750" algn="l" rtl="0">
                         <a:spcBef>
                           <a:spcPts val="0"/>
                         </a:spcBef>
@@ -18382,24 +19010,22 @@
                           <a:schemeClr val="dk1"/>
                         </a:buClr>
                         <a:buSzPts val="1100"/>
-                        <a:buFont typeface="Arial"/>
-                        <a:buNone/>
+                        <a:buFont typeface="Arial" panose="020B0604020202020204" pitchFamily="34" charset="0"/>
+                        <a:buChar char="•"/>
                       </a:pPr>
                       <a:r>
-                        <a:rPr lang="it" sz="900">
+                        <a:rPr lang="it-IT" sz="900" dirty="0">
                           <a:solidFill>
-                            <a:srgbClr val="D9D9D9"/>
+                            <a:schemeClr val="tx1"/>
                           </a:solidFill>
                           <a:latin typeface="Titillium Web"/>
-                          <a:ea typeface="Titillium Web"/>
-                          <a:cs typeface="Titillium Web"/>
                           <a:sym typeface="Titillium Web"/>
                         </a:rPr>
-                        <a:t>(Opzionale) descrivi il principio collegato...</a:t>
+                        <a:t>Flessibilità ed efficienza d’uso</a:t>
                       </a:r>
-                      <a:endParaRPr>
+                      <a:endParaRPr lang="it-IT" sz="900" dirty="0">
                         <a:solidFill>
-                          <a:srgbClr val="D9D9D9"/>
+                          <a:schemeClr val="tx1"/>
                         </a:solidFill>
                       </a:endParaRPr>
                     </a:p>
@@ -18418,7 +19044,7 @@
                         <a:buFont typeface="Arial"/>
                         <a:buNone/>
                       </a:pPr>
-                      <a:endParaRPr sz="900">
+                      <a:endParaRPr sz="900" dirty="0">
                         <a:solidFill>
                           <a:srgbClr val="D9D9D9"/>
                         </a:solidFill>
@@ -18449,7 +19075,7 @@
         </p:nvSpPr>
         <p:spPr>
           <a:xfrm>
-            <a:off x="3078483" y="4401900"/>
+            <a:off x="3015730" y="4499970"/>
             <a:ext cx="5330400" cy="566700"/>
           </a:xfrm>
           <a:prstGeom prst="rect">
@@ -18479,7 +19105,7 @@
               <a:buNone/>
             </a:pPr>
             <a:r>
-              <a:rPr lang="it" sz="800" b="1">
+              <a:rPr lang="it" sz="800" b="1" dirty="0">
                 <a:solidFill>
                   <a:srgbClr val="0056CB"/>
                 </a:solidFill>
@@ -18491,7 +19117,7 @@
               <a:t>* </a:t>
             </a:r>
             <a:r>
-              <a:rPr lang="it" sz="800">
+              <a:rPr lang="it" sz="800" dirty="0">
                 <a:solidFill>
                   <a:srgbClr val="0056CB"/>
                 </a:solidFill>
@@ -18503,7 +19129,7 @@
               <a:t>Per “</a:t>
             </a:r>
             <a:r>
-              <a:rPr lang="it" sz="800" b="1">
+              <a:rPr lang="it" sz="800" b="1" dirty="0">
                 <a:solidFill>
                   <a:srgbClr val="0056CB"/>
                 </a:solidFill>
@@ -18515,7 +19141,7 @@
               <a:t>problema</a:t>
             </a:r>
             <a:r>
-              <a:rPr lang="it" sz="800">
+              <a:rPr lang="it" sz="800" dirty="0">
                 <a:solidFill>
                   <a:srgbClr val="0056CB"/>
                 </a:solidFill>
@@ -18526,7 +19152,7 @@
               </a:rPr>
               <a:t>” si intende una qualunque difficoltà manifestata dal partecipante durante il test, considerata con diversi gradi di gravità e trascritti/registrati dal conduttore. Per es.: il partecipante esita a lungo nel cliccare su un punto della pagina e dice che non sa dove andare, oppure commenta negativamente.</a:t>
             </a:r>
-            <a:endParaRPr sz="800">
+            <a:endParaRPr sz="800" dirty="0">
               <a:solidFill>
                 <a:srgbClr val="0056CB"/>
               </a:solidFill>
@@ -18549,7 +19175,7 @@
               </a:spcAft>
               <a:buNone/>
             </a:pPr>
-            <a:endParaRPr sz="800" b="1">
+            <a:endParaRPr sz="800" b="1" dirty="0">
               <a:solidFill>
                 <a:srgbClr val="0056CB"/>
               </a:solidFill>
@@ -18573,7 +19199,7 @@
               <a:buNone/>
             </a:pPr>
             <a:r>
-              <a:rPr lang="it" sz="800" b="1">
+              <a:rPr lang="it" sz="800" b="1" dirty="0">
                 <a:solidFill>
                   <a:srgbClr val="0056CB"/>
                 </a:solidFill>
@@ -18585,7 +19211,7 @@
               <a:t>** </a:t>
             </a:r>
             <a:r>
-              <a:rPr lang="it" sz="800">
+              <a:rPr lang="it" sz="800" dirty="0">
                 <a:solidFill>
                   <a:srgbClr val="0056CB"/>
                 </a:solidFill>
@@ -18597,7 +19223,7 @@
               <a:t>Per “</a:t>
             </a:r>
             <a:r>
-              <a:rPr lang="it" sz="800" b="1">
+              <a:rPr lang="it" sz="800" b="1" dirty="0">
                 <a:solidFill>
                   <a:srgbClr val="0056CB"/>
                 </a:solidFill>
@@ -18609,7 +19235,7 @@
               <a:t>criticità</a:t>
             </a:r>
             <a:r>
-              <a:rPr lang="it" sz="800">
+              <a:rPr lang="it" sz="800" dirty="0">
                 <a:solidFill>
                   <a:srgbClr val="0056CB"/>
                 </a:solidFill>
@@ -18620,7 +19246,7 @@
               </a:rPr>
               <a:t>” s’intende un qualunque punto o funzionalità dell’interfaccia collegato al verificarsi di un problema del partecipante e riferibile alla violazione di un qualunque principio euristico di usabilità o, prima ancora, di buon senso. Ad es. un menu, l’etichetta di un link o un contenuto testuale che si possa ipotizzare provochino un'esperienza negativa nell’utente. </a:t>
             </a:r>
-            <a:endParaRPr sz="800">
+            <a:endParaRPr sz="800" dirty="0">
               <a:solidFill>
                 <a:srgbClr val="0056CB"/>
               </a:solidFill>
@@ -18643,7 +19269,7 @@
               </a:spcAft>
               <a:buNone/>
             </a:pPr>
-            <a:endParaRPr sz="800">
+            <a:endParaRPr sz="800" dirty="0">
               <a:solidFill>
                 <a:srgbClr val="0056CB"/>
               </a:solidFill>
@@ -18666,7 +19292,7 @@
               </a:spcAft>
               <a:buNone/>
             </a:pPr>
-            <a:endParaRPr sz="800">
+            <a:endParaRPr sz="800" dirty="0">
               <a:solidFill>
                 <a:srgbClr val="0056CB"/>
               </a:solidFill>
@@ -18689,7 +19315,7 @@
               </a:spcAft>
               <a:buNone/>
             </a:pPr>
-            <a:endParaRPr sz="800">
+            <a:endParaRPr sz="800" dirty="0">
               <a:solidFill>
                 <a:srgbClr val="0056CB"/>
               </a:solidFill>
@@ -18712,7 +19338,7 @@
               </a:spcAft>
               <a:buNone/>
             </a:pPr>
-            <a:endParaRPr sz="800">
+            <a:endParaRPr sz="800" dirty="0">
               <a:solidFill>
                 <a:srgbClr val="0056CB"/>
               </a:solidFill>
@@ -18735,7 +19361,7 @@
               </a:spcAft>
               <a:buNone/>
             </a:pPr>
-            <a:endParaRPr sz="800">
+            <a:endParaRPr sz="800" dirty="0">
               <a:solidFill>
                 <a:srgbClr val="0056CB"/>
               </a:solidFill>
@@ -18758,7 +19384,7 @@
               </a:spcAft>
               <a:buNone/>
             </a:pPr>
-            <a:endParaRPr sz="800">
+            <a:endParaRPr sz="800" dirty="0">
               <a:solidFill>
                 <a:srgbClr val="0056CB"/>
               </a:solidFill>
@@ -18782,7 +19408,7 @@
               <a:buNone/>
             </a:pPr>
             <a:r>
-              <a:rPr lang="it" sz="800">
+              <a:rPr lang="it" sz="800" dirty="0">
                 <a:solidFill>
                   <a:srgbClr val="0056CB"/>
                 </a:solidFill>
@@ -18793,7 +19419,7 @@
               </a:rPr>
               <a:t> </a:t>
             </a:r>
-            <a:endParaRPr sz="800">
+            <a:endParaRPr sz="800" dirty="0">
               <a:solidFill>
                 <a:srgbClr val="0056CB"/>
               </a:solidFill>

</xml_diff>